<commit_message>
Added and tested return_one_column
</commit_message>
<xml_diff>
--- a/project_schematics.pptx
+++ b/project_schematics.pptx
@@ -67,7 +67,7 @@
         <p:txBody>
           <a:bodyPr/>
           <a:p>
-            <a:fld id="{E9143F72-3B56-4CE2-954D-A75AAB73AE2E}" type="slidenum">
+            <a:fld id="{113D9047-C9A6-4541-9BDD-9867CD9BC87C}" type="slidenum">
               <a:t>&lt;#&gt;</a:t>
             </a:fld>
           </a:p>
@@ -255,7 +255,7 @@
         <p:txBody>
           <a:bodyPr/>
           <a:p>
-            <a:fld id="{69BAD695-5010-445C-A10C-BA834E978605}" type="slidenum">
+            <a:fld id="{284DB841-881E-4AE5-9B69-F382F33A50D5}" type="slidenum">
               <a:t>&lt;#&gt;</a:t>
             </a:fld>
           </a:p>
@@ -511,7 +511,7 @@
         <p:txBody>
           <a:bodyPr/>
           <a:p>
-            <a:fld id="{8EEA7A55-B418-4D04-A174-2F2948FE0482}" type="slidenum">
+            <a:fld id="{5FE12DD5-1DEA-4511-98C3-967233E12A6E}" type="slidenum">
               <a:t>&lt;#&gt;</a:t>
             </a:fld>
           </a:p>
@@ -835,7 +835,7 @@
         <p:txBody>
           <a:bodyPr/>
           <a:p>
-            <a:fld id="{FA69A8A9-68B8-43FE-AC41-A524218472FC}" type="slidenum">
+            <a:fld id="{D9A09356-A7C8-43FA-A703-43BF6FB74646}" type="slidenum">
               <a:t>&lt;#&gt;</a:t>
             </a:fld>
           </a:p>
@@ -918,7 +918,7 @@
         <p:txBody>
           <a:bodyPr/>
           <a:p>
-            <a:fld id="{D47A9AF9-EDD3-4266-B363-2C8FCB2CB964}" type="slidenum">
+            <a:fld id="{349991F9-1E07-4743-A8C3-53AD2EAC755D}" type="slidenum">
               <a:t>&lt;#&gt;</a:t>
             </a:fld>
           </a:p>
@@ -1075,7 +1075,7 @@
         <p:txBody>
           <a:bodyPr/>
           <a:p>
-            <a:fld id="{306E17D7-B4EA-4BAC-AC3A-3A9EA6A6B85C}" type="slidenum">
+            <a:fld id="{3B99C301-9182-4BB0-A21D-ECCE3A57757D}" type="slidenum">
               <a:t>&lt;#&gt;</a:t>
             </a:fld>
           </a:p>
@@ -1229,7 +1229,7 @@
         <p:txBody>
           <a:bodyPr/>
           <a:p>
-            <a:fld id="{32358653-2EA6-41F2-AA31-272E6F982EBD}" type="slidenum">
+            <a:fld id="{6EFCCF04-BB89-477C-AB72-68DEB237B6FB}" type="slidenum">
               <a:t>&lt;#&gt;</a:t>
             </a:fld>
           </a:p>
@@ -1417,7 +1417,7 @@
         <p:txBody>
           <a:bodyPr/>
           <a:p>
-            <a:fld id="{B2900A2B-1491-4403-9818-94DEE1ABB374}" type="slidenum">
+            <a:fld id="{6AEB63A8-C4F3-4C0A-9E26-5A0925B81099}" type="slidenum">
               <a:t>&lt;#&gt;</a:t>
             </a:fld>
           </a:p>
@@ -1537,7 +1537,7 @@
         <p:txBody>
           <a:bodyPr/>
           <a:p>
-            <a:fld id="{F3C960C2-533F-42A8-91E7-F11F96F307B6}" type="slidenum">
+            <a:fld id="{C153759A-7DEA-4852-8074-6383194300F1}" type="slidenum">
               <a:t>&lt;#&gt;</a:t>
             </a:fld>
           </a:p>
@@ -1657,7 +1657,7 @@
         <p:txBody>
           <a:bodyPr/>
           <a:p>
-            <a:fld id="{1993EF89-4AFC-4EA5-9940-0A8F9A82EAF6}" type="slidenum">
+            <a:fld id="{AEE0B000-89B3-4E3F-AF40-5E4B3BFA9166}" type="slidenum">
               <a:t>&lt;#&gt;</a:t>
             </a:fld>
           </a:p>
@@ -1879,7 +1879,7 @@
         <p:txBody>
           <a:bodyPr/>
           <a:p>
-            <a:fld id="{5159181A-A62A-4326-A6FC-8674A99E5458}" type="slidenum">
+            <a:fld id="{380779CE-BA42-4442-9530-D8D36D5E3971}" type="slidenum">
               <a:t>&lt;#&gt;</a:t>
             </a:fld>
           </a:p>
@@ -2036,7 +2036,7 @@
         <p:txBody>
           <a:bodyPr/>
           <a:p>
-            <a:fld id="{B5AE7685-861B-4FBA-B4C8-72B2414DB986}" type="slidenum">
+            <a:fld id="{296EC72F-6EAD-40C2-9904-F4CC4EFD0EC8}" type="slidenum">
               <a:t>&lt;#&gt;</a:t>
             </a:fld>
           </a:p>
@@ -2258,7 +2258,7 @@
         <p:txBody>
           <a:bodyPr/>
           <a:p>
-            <a:fld id="{53422003-91A5-4D96-98C7-51D5055E67A0}" type="slidenum">
+            <a:fld id="{AD551CEF-7F6F-41FC-9B7A-D748186D8688}" type="slidenum">
               <a:t>&lt;#&gt;</a:t>
             </a:fld>
           </a:p>
@@ -2480,7 +2480,7 @@
         <p:txBody>
           <a:bodyPr/>
           <a:p>
-            <a:fld id="{12B8C05A-FE16-4831-9173-C4B359514870}" type="slidenum">
+            <a:fld id="{BB048CCF-023D-472C-A0B9-33E8540E31C9}" type="slidenum">
               <a:t>&lt;#&gt;</a:t>
             </a:fld>
           </a:p>
@@ -2668,7 +2668,7 @@
         <p:txBody>
           <a:bodyPr/>
           <a:p>
-            <a:fld id="{E6E6F63B-43A9-467F-ABE5-E5F8790ADF37}" type="slidenum">
+            <a:fld id="{AE09E075-1BA4-4CC0-AC36-FB21AAE7730D}" type="slidenum">
               <a:t>&lt;#&gt;</a:t>
             </a:fld>
           </a:p>
@@ -2924,7 +2924,7 @@
         <p:txBody>
           <a:bodyPr/>
           <a:p>
-            <a:fld id="{9A25A4B8-A2E3-4CD7-9E28-4E5B28660091}" type="slidenum">
+            <a:fld id="{B01AE02D-1BB0-4F3F-9258-7EAC753F29C6}" type="slidenum">
               <a:t>&lt;#&gt;</a:t>
             </a:fld>
           </a:p>
@@ -3248,7 +3248,7 @@
         <p:txBody>
           <a:bodyPr/>
           <a:p>
-            <a:fld id="{73C8A3CB-7063-4485-8085-CB4A8E6DA35E}" type="slidenum">
+            <a:fld id="{125EBE72-07C5-407F-BE50-B26DF8CE5CBD}" type="slidenum">
               <a:t>&lt;#&gt;</a:t>
             </a:fld>
           </a:p>
@@ -3402,7 +3402,7 @@
         <p:txBody>
           <a:bodyPr/>
           <a:p>
-            <a:fld id="{6BDCED27-E754-45FD-B00F-9610471BE7B9}" type="slidenum">
+            <a:fld id="{7C748E2C-751C-4659-A498-6D93A59B3428}" type="slidenum">
               <a:t>&lt;#&gt;</a:t>
             </a:fld>
           </a:p>
@@ -3590,7 +3590,7 @@
         <p:txBody>
           <a:bodyPr/>
           <a:p>
-            <a:fld id="{CD954E55-68E7-4897-9061-82E4FAB40C9A}" type="slidenum">
+            <a:fld id="{B2D793E5-AFEF-48E3-BC40-31B339907DA7}" type="slidenum">
               <a:t>&lt;#&gt;</a:t>
             </a:fld>
           </a:p>
@@ -3710,7 +3710,7 @@
         <p:txBody>
           <a:bodyPr/>
           <a:p>
-            <a:fld id="{FC4F6B72-2D3C-461A-999D-EE2DB437120F}" type="slidenum">
+            <a:fld id="{E924EE6B-6D48-4A9C-8883-AD746904F64F}" type="slidenum">
               <a:t>&lt;#&gt;</a:t>
             </a:fld>
           </a:p>
@@ -3830,7 +3830,7 @@
         <p:txBody>
           <a:bodyPr/>
           <a:p>
-            <a:fld id="{E0FD2D08-4F3B-4C37-B648-35BF1498FAD1}" type="slidenum">
+            <a:fld id="{FAF88683-07A8-41C2-95C6-021A61E603D8}" type="slidenum">
               <a:t>&lt;#&gt;</a:t>
             </a:fld>
           </a:p>
@@ -4052,7 +4052,7 @@
         <p:txBody>
           <a:bodyPr/>
           <a:p>
-            <a:fld id="{219523B1-D382-45A0-87C0-6785065AE665}" type="slidenum">
+            <a:fld id="{90AA9F5C-8E2F-4B46-B423-90671DE4E0DB}" type="slidenum">
               <a:t>&lt;#&gt;</a:t>
             </a:fld>
           </a:p>
@@ -4274,7 +4274,7 @@
         <p:txBody>
           <a:bodyPr/>
           <a:p>
-            <a:fld id="{37527B4C-96B1-4677-8A6C-F6245EF35F8F}" type="slidenum">
+            <a:fld id="{8E0FF6AA-62C6-498B-852D-99EFC7C7C459}" type="slidenum">
               <a:t>&lt;#&gt;</a:t>
             </a:fld>
           </a:p>
@@ -4496,7 +4496,7 @@
         <p:txBody>
           <a:bodyPr/>
           <a:p>
-            <a:fld id="{329091A7-7C7F-44DA-9475-36F16E4142BC}" type="slidenum">
+            <a:fld id="{70B3C4D3-F8D7-4D2A-A4B7-CBE0CB730BBF}" type="slidenum">
               <a:t>&lt;#&gt;</a:t>
             </a:fld>
           </a:p>
@@ -4577,7 +4577,13 @@
               <a:rPr b="0" lang="fr-CH" sz="1800" spc="-1" strike="noStrike">
                 <a:latin typeface="Arial"/>
               </a:rPr>
-              <a:t>Click to edit the title text format</a:t>
+              <a:t>Click to edit the </a:t>
+            </a:r>
+            <a:r>
+              <a:rPr b="0" lang="fr-CH" sz="1800" spc="-1" strike="noStrike">
+                <a:latin typeface="Arial"/>
+              </a:rPr>
+              <a:t>title text format</a:t>
             </a:r>
             <a:endParaRPr b="0" lang="fr-CH" sz="1800" spc="-1" strike="noStrike">
               <a:latin typeface="Arial"/>
@@ -4634,7 +4640,7 @@
               <a:rPr b="0" lang="fr-CH" sz="1400" spc="-1" strike="noStrike">
                 <a:latin typeface="Times New Roman"/>
               </a:rPr>
-              <a:t> </a:t>
+              <a:t>&lt;footer&gt;</a:t>
             </a:r>
             <a:endParaRPr b="0" lang="fr-CH" sz="1400" spc="-1" strike="noStrike">
               <a:latin typeface="Times New Roman"/>
@@ -4687,11 +4693,11 @@
               </a:lnSpc>
               <a:buNone/>
             </a:pPr>
-            <a:fld id="{4F42CE00-2726-4BA5-B906-D19B93F30245}" type="slidenum">
+            <a:fld id="{143056E5-70C5-4E9C-9709-D2B4EFE30FB3}" type="slidenum">
               <a:rPr b="0" lang="fr-CH" sz="1400" spc="-1" strike="noStrike">
                 <a:latin typeface="Times New Roman"/>
               </a:rPr>
-              <a:t>3</a:t>
+              <a:t>&lt;number&gt;</a:t>
             </a:fld>
             <a:endParaRPr b="0" lang="fr-CH" sz="1400" spc="-1" strike="noStrike">
               <a:latin typeface="Times New Roman"/>
@@ -4738,7 +4744,7 @@
               <a:rPr b="0" lang="fr-CH" sz="1400" spc="-1" strike="noStrike">
                 <a:latin typeface="Times New Roman"/>
               </a:rPr>
-              <a:t> </a:t>
+              <a:t>&lt;date/time&gt;</a:t>
             </a:r>
             <a:endParaRPr b="0" lang="fr-CH" sz="1400" spc="-1" strike="noStrike">
               <a:latin typeface="Times New Roman"/>
@@ -4998,7 +5004,13 @@
               <a:rPr b="0" lang="fr-CH" sz="1800" spc="-1" strike="noStrike">
                 <a:latin typeface="Arial"/>
               </a:rPr>
-              <a:t>Click to edit the title text format</a:t>
+              <a:t>Click to edit the </a:t>
+            </a:r>
+            <a:r>
+              <a:rPr b="0" lang="fr-CH" sz="1800" spc="-1" strike="noStrike">
+                <a:latin typeface="Arial"/>
+              </a:rPr>
+              <a:t>title text format</a:t>
             </a:r>
             <a:endParaRPr b="0" lang="fr-CH" sz="1800" spc="-1" strike="noStrike">
               <a:latin typeface="Arial"/>
@@ -5291,7 +5303,7 @@
               </a:lnSpc>
               <a:buNone/>
             </a:pPr>
-            <a:fld id="{5FC721EB-563F-4A3F-9A90-1ABABEA90B6D}" type="slidenum">
+            <a:fld id="{0E0A5C96-A127-4378-8918-4A847DC0163D}" type="slidenum">
               <a:rPr b="0" lang="fr-CH" sz="1400" spc="-1" strike="noStrike">
                 <a:latin typeface="Times New Roman"/>
               </a:rPr>
@@ -6035,7 +6047,43 @@
               <a:rPr b="0" i="1" lang="fr-CH" sz="1800" spc="-1" strike="noStrike">
                 <a:latin typeface="Arial"/>
               </a:rPr>
-              <a:t>Ideally measurement batch module is the only thing that interacts with more than one other module</a:t>
+              <a:t>Ideally </a:t>
+            </a:r>
+            <a:r>
+              <a:rPr b="0" i="1" lang="fr-CH" sz="1800" spc="-1" strike="noStrike">
+                <a:latin typeface="Arial"/>
+              </a:rPr>
+              <a:t>measurement </a:t>
+            </a:r>
+            <a:r>
+              <a:rPr b="0" i="1" lang="fr-CH" sz="1800" spc="-1" strike="noStrike">
+                <a:latin typeface="Arial"/>
+              </a:rPr>
+              <a:t>batch module is </a:t>
+            </a:r>
+            <a:r>
+              <a:rPr b="0" i="1" lang="fr-CH" sz="1800" spc="-1" strike="noStrike">
+                <a:latin typeface="Arial"/>
+              </a:rPr>
+              <a:t>the only thing that </a:t>
+            </a:r>
+            <a:r>
+              <a:rPr b="0" i="1" lang="fr-CH" sz="1800" spc="-1" strike="noStrike">
+                <a:latin typeface="Arial"/>
+              </a:rPr>
+              <a:t>interacts with </a:t>
+            </a:r>
+            <a:r>
+              <a:rPr b="0" i="1" lang="fr-CH" sz="1800" spc="-1" strike="noStrike">
+                <a:latin typeface="Arial"/>
+              </a:rPr>
+              <a:t>more than one </a:t>
+            </a:r>
+            <a:r>
+              <a:rPr b="0" i="1" lang="fr-CH" sz="1800" spc="-1" strike="noStrike">
+                <a:latin typeface="Arial"/>
+              </a:rPr>
+              <a:t>other module</a:t>
             </a:r>
             <a:endParaRPr b="0" lang="fr-CH" sz="1800" spc="-1" strike="noStrike">
               <a:latin typeface="Arial"/>
@@ -6885,7 +6933,7 @@
                 <a:latin typeface="Arial"/>
                 <a:ea typeface="DejaVu Sans"/>
               </a:rPr>
-              <a:t>instrument</a:t>
+              <a:t>instrument_tab</a:t>
             </a:r>
             <a:endParaRPr b="0" lang="fr-CH" sz="1800" spc="-1" strike="noStrike">
               <a:latin typeface="Arial"/>
@@ -7089,7 +7137,19 @@
               <a:rPr b="0" lang="fr-CH" sz="1800" spc="-1" strike="noStrike">
                 <a:latin typeface="Arial"/>
               </a:rPr>
-              <a:t>This version has no connections between tables. </a:t>
+              <a:t>This version has </a:t>
+            </a:r>
+            <a:r>
+              <a:rPr b="0" lang="fr-CH" sz="1800" spc="-1" strike="noStrike">
+                <a:latin typeface="Arial"/>
+              </a:rPr>
+              <a:t>no connections </a:t>
+            </a:r>
+            <a:r>
+              <a:rPr b="0" lang="fr-CH" sz="1800" spc="-1" strike="noStrike">
+                <a:latin typeface="Arial"/>
+              </a:rPr>
+              <a:t>between tables. </a:t>
             </a:r>
             <a:endParaRPr b="0" lang="fr-CH" sz="1800" spc="-1" strike="noStrike">
               <a:latin typeface="Arial"/>
@@ -7100,7 +7160,31 @@
               <a:rPr b="0" lang="fr-CH" sz="1800" spc="-1" strike="noStrike">
                 <a:latin typeface="Arial"/>
               </a:rPr>
-              <a:t>The point is to have something to connect to for MetaCapturer dev</a:t>
+              <a:t>The point is to </a:t>
+            </a:r>
+            <a:r>
+              <a:rPr b="0" lang="fr-CH" sz="1800" spc="-1" strike="noStrike">
+                <a:latin typeface="Arial"/>
+              </a:rPr>
+              <a:t>have something </a:t>
+            </a:r>
+            <a:r>
+              <a:rPr b="0" lang="fr-CH" sz="1800" spc="-1" strike="noStrike">
+                <a:latin typeface="Arial"/>
+              </a:rPr>
+              <a:t>to connect to for </a:t>
+            </a:r>
+            <a:r>
+              <a:rPr b="0" lang="fr-CH" sz="1800" spc="-1" strike="noStrike">
+                <a:latin typeface="Arial"/>
+              </a:rPr>
+              <a:t>MetaCapturer </a:t>
+            </a:r>
+            <a:r>
+              <a:rPr b="0" lang="fr-CH" sz="1800" spc="-1" strike="noStrike">
+                <a:latin typeface="Arial"/>
+              </a:rPr>
+              <a:t>dev</a:t>
             </a:r>
             <a:endParaRPr b="0" lang="fr-CH" sz="1800" spc="-1" strike="noStrike">
               <a:latin typeface="Arial"/>

</xml_diff>